<commit_message>
writeup and small changes
</commit_message>
<xml_diff>
--- a/Facebook Field Study with Local Politicians/Skagen workshop/STANDBY presentation_IDA.pptx
+++ b/Facebook Field Study with Local Politicians/Skagen workshop/STANDBY presentation_IDA.pptx
@@ -272,7 +272,7 @@
           <a:p>
             <a:fld id="{79C5A860-F335-4252-AA00-24FB67ED2982}" type="datetime1">
               <a:rPr lang="en-US" smtClean="0"/>
-              <a:t>6/17/24</a:t>
+              <a:t>6/19/24</a:t>
             </a:fld>
             <a:endParaRPr lang="en-US"/>
           </a:p>
@@ -471,7 +471,7 @@
           <a:p>
             <a:fld id="{46AB1048-0047-48CA-88BA-D69B470942CF}" type="datetime1">
               <a:rPr lang="en-US" smtClean="0"/>
-              <a:t>6/17/24</a:t>
+              <a:t>6/19/24</a:t>
             </a:fld>
             <a:endParaRPr lang="en-US"/>
           </a:p>
@@ -681,7 +681,7 @@
           <a:p>
             <a:fld id="{5BD83879-648C-49A9-81A2-0EF5946532D0}" type="datetime1">
               <a:rPr lang="en-US" smtClean="0"/>
-              <a:t>6/17/24</a:t>
+              <a:t>6/19/24</a:t>
             </a:fld>
             <a:endParaRPr lang="en-US"/>
           </a:p>
@@ -879,7 +879,7 @@
           <a:p>
             <a:fld id="{D04BC802-30E3-4658-9CCA-F873646FEC67}" type="datetime1">
               <a:rPr lang="en-US" smtClean="0"/>
-              <a:t>6/17/24</a:t>
+              <a:t>6/19/24</a:t>
             </a:fld>
             <a:endParaRPr lang="en-US"/>
           </a:p>
@@ -1157,7 +1157,7 @@
           <a:p>
             <a:fld id="{0AB227A3-19CE-4153-81CE-64EB7AB094B3}" type="datetime1">
               <a:rPr lang="en-US" smtClean="0"/>
-              <a:t>6/17/24</a:t>
+              <a:t>6/19/24</a:t>
             </a:fld>
             <a:endParaRPr lang="en-US"/>
           </a:p>
@@ -1424,7 +1424,7 @@
           <a:p>
             <a:fld id="{B819A100-10F6-477E-8847-29D479EF1C92}" type="datetime1">
               <a:rPr lang="en-US" smtClean="0"/>
-              <a:t>6/17/24</a:t>
+              <a:t>6/19/24</a:t>
             </a:fld>
             <a:endParaRPr lang="en-US"/>
           </a:p>
@@ -1838,7 +1838,7 @@
           <a:p>
             <a:fld id="{5DF128AB-198A-495F-8475-FDB360C9873F}" type="datetime1">
               <a:rPr lang="en-US" smtClean="0"/>
-              <a:t>6/17/24</a:t>
+              <a:t>6/19/24</a:t>
             </a:fld>
             <a:endParaRPr lang="en-US"/>
           </a:p>
@@ -1979,7 +1979,7 @@
           <a:p>
             <a:fld id="{021A235E-F8FD-479F-9FC7-18BE84110877}" type="datetime1">
               <a:rPr lang="en-US" smtClean="0"/>
-              <a:t>6/17/24</a:t>
+              <a:t>6/19/24</a:t>
             </a:fld>
             <a:endParaRPr lang="en-US"/>
           </a:p>
@@ -2092,7 +2092,7 @@
           <a:p>
             <a:fld id="{E890F09B-68DA-462E-9DB4-4C9ADAB8CBCC}" type="datetime1">
               <a:rPr lang="en-US" smtClean="0"/>
-              <a:t>6/17/24</a:t>
+              <a:t>6/19/24</a:t>
             </a:fld>
             <a:endParaRPr lang="en-US"/>
           </a:p>
@@ -2411,7 +2411,7 @@
           <a:p>
             <a:fld id="{17AC4E36-FABE-47EB-AA7F-C19A93824617}" type="datetime1">
               <a:rPr lang="en-US" smtClean="0"/>
-              <a:t>6/17/24</a:t>
+              <a:t>6/19/24</a:t>
             </a:fld>
             <a:endParaRPr lang="en-US"/>
           </a:p>
@@ -2708,7 +2708,7 @@
           <a:p>
             <a:fld id="{F199CE6B-5DE6-4A2D-B72E-5E8969F9F56F}" type="datetime1">
               <a:rPr lang="en-US" smtClean="0"/>
-              <a:t>6/17/24</a:t>
+              <a:t>6/19/24</a:t>
             </a:fld>
             <a:endParaRPr lang="en-US"/>
           </a:p>
@@ -3566,7 +3566,7 @@
           <a:p>
             <a:fld id="{F481A142-DA77-4A5F-AD1F-14E6C18F0F5F}" type="datetime1">
               <a:rPr lang="en-US" smtClean="0"/>
-              <a:t>6/17/24</a:t>
+              <a:t>6/19/24</a:t>
             </a:fld>
             <a:endParaRPr lang="en-US" dirty="0"/>
           </a:p>
@@ -4634,7 +4634,7 @@
         </p:blipFill>
         <p:spPr>
           <a:xfrm>
-            <a:off x="0" y="-15567"/>
+            <a:off x="0" y="267501"/>
             <a:ext cx="5242562" cy="4293415"/>
           </a:xfrm>
           <a:custGeom>

</xml_diff>